<commit_message>
- Pass the Mainform as dialog windows owner, so it can still track the ownership of the form and refresh the dashboard list after adding some data on the Bet form. - Remove debugging lines - Add Draft Settings Form - Add toolbar shortcut for Pick Generator Form
</commit_message>
<xml_diff>
--- a/Resources/Design/SplashScreen.pptx
+++ b/Resources/Design/SplashScreen.pptx
@@ -104,6 +104,11 @@
       </a:defRPr>
     </a:lvl9pPr>
   </p:defaultTextStyle>
+  <p:extLst>
+    <p:ext uri="{EFAFB233-063F-42B5-8137-9DF3F51BA10A}">
+      <p15:sldGuideLst xmlns:p15="http://schemas.microsoft.com/office/powerpoint/2012/main"/>
+    </p:ext>
+  </p:extLst>
 </p:presentation>
 </file>
 
@@ -263,7 +268,7 @@
             <a:fld id="{11A6662E-FAF4-44BC-88B5-85A7CBFB6D30}" type="datetime1">
               <a:rPr lang="en-US" smtClean="0"/>
               <a:pPr/>
-              <a:t>3/24/2021</a:t>
+              <a:t>3/26/2021</a:t>
             </a:fld>
             <a:endParaRPr lang="en-US"/>
           </a:p>
@@ -474,7 +479,7 @@
           <a:p>
             <a:fld id="{4C559632-1575-4E14-B53B-3DC3D5ED3947}" type="datetime1">
               <a:rPr lang="en-US" smtClean="0"/>
-              <a:t>3/24/2021</a:t>
+              <a:t>3/26/2021</a:t>
             </a:fld>
             <a:endParaRPr lang="en-US"/>
           </a:p>
@@ -682,7 +687,7 @@
           <a:p>
             <a:fld id="{CC4A6868-2568-4CC9-B302-F37117B01A6E}" type="datetime1">
               <a:rPr lang="en-US" smtClean="0"/>
-              <a:t>3/24/2021</a:t>
+              <a:t>3/26/2021</a:t>
             </a:fld>
             <a:endParaRPr lang="en-US"/>
           </a:p>
@@ -885,7 +890,7 @@
           <a:p>
             <a:fld id="{0055F08A-1E71-4B2B-BB49-E743F2903911}" type="datetime1">
               <a:rPr lang="en-US" smtClean="0"/>
-              <a:t>3/24/2021</a:t>
+              <a:t>3/26/2021</a:t>
             </a:fld>
             <a:endParaRPr lang="en-US" dirty="0"/>
           </a:p>
@@ -1159,7 +1164,7 @@
           <a:p>
             <a:fld id="{15417D9E-721A-44BB-8863-9873FE64DA75}" type="datetime1">
               <a:rPr lang="en-US" smtClean="0"/>
-              <a:t>3/24/2021</a:t>
+              <a:t>3/26/2021</a:t>
             </a:fld>
             <a:endParaRPr lang="en-US"/>
           </a:p>
@@ -1429,7 +1434,7 @@
           <a:p>
             <a:fld id="{5F31DA2F-80B8-49CF-99FB-5ABCA53A607A}" type="datetime1">
               <a:rPr lang="en-US" smtClean="0"/>
-              <a:t>3/24/2021</a:t>
+              <a:t>3/26/2021</a:t>
             </a:fld>
             <a:endParaRPr lang="en-US"/>
           </a:p>
@@ -1842,7 +1847,7 @@
           <a:p>
             <a:fld id="{28852172-E6C9-4B6C-929A-A9DE3837BBF1}" type="datetime1">
               <a:rPr lang="en-US" smtClean="0"/>
-              <a:t>3/24/2021</a:t>
+              <a:t>3/26/2021</a:t>
             </a:fld>
             <a:endParaRPr lang="en-US"/>
           </a:p>
@@ -1988,7 +1993,7 @@
           <a:p>
             <a:fld id="{3AB41CFF-90C9-47B3-9DA1-F2BF8D839F7E}" type="datetime1">
               <a:rPr lang="en-US" smtClean="0"/>
-              <a:t>3/24/2021</a:t>
+              <a:t>3/26/2021</a:t>
             </a:fld>
             <a:endParaRPr lang="en-US"/>
           </a:p>
@@ -2101,7 +2106,7 @@
           <a:p>
             <a:fld id="{F06048FA-06AB-4884-A69B-986B96E68A24}" type="datetime1">
               <a:rPr lang="en-US" smtClean="0"/>
-              <a:t>3/24/2021</a:t>
+              <a:t>3/26/2021</a:t>
             </a:fld>
             <a:endParaRPr lang="en-US"/>
           </a:p>
@@ -2412,7 +2417,7 @@
           <a:p>
             <a:fld id="{50DB7ABA-0172-4F9C-889D-567164F66BCD}" type="datetime1">
               <a:rPr lang="en-US" smtClean="0"/>
-              <a:t>3/24/2021</a:t>
+              <a:t>3/26/2021</a:t>
             </a:fld>
             <a:endParaRPr lang="en-US"/>
           </a:p>
@@ -2703,7 +2708,7 @@
           <a:p>
             <a:fld id="{78AC6A5B-8AE7-4A41-B5A7-9ADC6686DC18}" type="datetime1">
               <a:rPr lang="en-US" smtClean="0"/>
-              <a:t>3/24/2021</a:t>
+              <a:t>3/26/2021</a:t>
             </a:fld>
             <a:endParaRPr lang="en-US"/>
           </a:p>
@@ -3049,7 +3054,7 @@
             <a:fld id="{57E0CF6C-748E-4B7A-BC8B-3011EF78ED13}" type="datetime1">
               <a:rPr lang="en-US" smtClean="0"/>
               <a:pPr/>
-              <a:t>3/24/2021</a:t>
+              <a:t>3/26/2021</a:t>
             </a:fld>
             <a:endParaRPr lang="en-US" dirty="0"/>
           </a:p>
@@ -3766,7 +3771,7 @@
                   <a:srgbClr val="FFFFFF"/>
                 </a:solidFill>
               </a:rPr>
-              <a:t>Data Lotto Manager</a:t>
+              <a:t>Lotto Data Manager</a:t>
             </a:r>
           </a:p>
         </p:txBody>

</xml_diff>